<commit_message>
Team member list correction.
</commit_message>
<xml_diff>
--- a/M_PametenGovorecDomaciAsistent/Presentation.pptx
+++ b/M_PametenGovorecDomaciAsistent/Presentation.pptx
@@ -385,7 +385,7 @@
           <a:p>
             <a:fld id="{B03B4544-868C-4E0F-8B18-405C38F55D1E}" type="datetimeFigureOut">
               <a:rPr lang="en-GB" smtClean="0"/>
-              <a:t>26/11/17</a:t>
+              <a:t>28/11/2017</a:t>
             </a:fld>
             <a:endParaRPr lang="en-GB"/>
           </a:p>
@@ -507,7 +507,7 @@
           <p:nvPr/>
         </p:nvPicPr>
         <p:blipFill>
-          <a:blip r:embed="rId3">
+          <a:blip r:embed="rId3" cstate="print">
             <a:extLst>
               <a:ext uri="{28A0092B-C50C-407E-A947-70E740481C1C}">
                 <a14:useLocalDpi xmlns:a14="http://schemas.microsoft.com/office/drawing/2010/main" val="0"/>
@@ -799,7 +799,7 @@
           <a:p>
             <a:fld id="{B03B4544-868C-4E0F-8B18-405C38F55D1E}" type="datetimeFigureOut">
               <a:rPr lang="en-GB" smtClean="0"/>
-              <a:t>26/11/17</a:t>
+              <a:t>28/11/2017</a:t>
             </a:fld>
             <a:endParaRPr lang="en-GB"/>
           </a:p>
@@ -921,7 +921,7 @@
           <p:nvPr/>
         </p:nvPicPr>
         <p:blipFill>
-          <a:blip r:embed="rId3">
+          <a:blip r:embed="rId3" cstate="print">
             <a:extLst>
               <a:ext uri="{28A0092B-C50C-407E-A947-70E740481C1C}">
                 <a14:useLocalDpi xmlns:a14="http://schemas.microsoft.com/office/drawing/2010/main" val="0"/>
@@ -1135,7 +1135,7 @@
           <a:p>
             <a:fld id="{B03B4544-868C-4E0F-8B18-405C38F55D1E}" type="datetimeFigureOut">
               <a:rPr lang="en-GB" smtClean="0"/>
-              <a:t>26/11/17</a:t>
+              <a:t>28/11/2017</a:t>
             </a:fld>
             <a:endParaRPr lang="en-GB"/>
           </a:p>
@@ -1257,7 +1257,7 @@
           <p:nvPr/>
         </p:nvPicPr>
         <p:blipFill>
-          <a:blip r:embed="rId3">
+          <a:blip r:embed="rId3" cstate="print">
             <a:extLst>
               <a:ext uri="{28A0092B-C50C-407E-A947-70E740481C1C}">
                 <a14:useLocalDpi xmlns:a14="http://schemas.microsoft.com/office/drawing/2010/main" val="0"/>
@@ -1540,7 +1540,7 @@
           <a:p>
             <a:fld id="{B03B4544-868C-4E0F-8B18-405C38F55D1E}" type="datetimeFigureOut">
               <a:rPr lang="en-GB" smtClean="0"/>
-              <a:t>26/11/17</a:t>
+              <a:t>28/11/2017</a:t>
             </a:fld>
             <a:endParaRPr lang="en-GB"/>
           </a:p>
@@ -1894,7 +1894,7 @@
           <p:nvPr/>
         </p:nvPicPr>
         <p:blipFill>
-          <a:blip r:embed="rId3">
+          <a:blip r:embed="rId3" cstate="print">
             <a:extLst>
               <a:ext uri="{28A0092B-C50C-407E-A947-70E740481C1C}">
                 <a14:useLocalDpi xmlns:a14="http://schemas.microsoft.com/office/drawing/2010/main" val="0"/>
@@ -2108,7 +2108,7 @@
           <a:p>
             <a:fld id="{B03B4544-868C-4E0F-8B18-405C38F55D1E}" type="datetimeFigureOut">
               <a:rPr lang="en-GB" smtClean="0"/>
-              <a:t>26/11/17</a:t>
+              <a:t>28/11/2017</a:t>
             </a:fld>
             <a:endParaRPr lang="en-GB"/>
           </a:p>
@@ -2230,7 +2230,7 @@
           <p:nvPr/>
         </p:nvPicPr>
         <p:blipFill>
-          <a:blip r:embed="rId3">
+          <a:blip r:embed="rId3" cstate="print">
             <a:extLst>
               <a:ext uri="{28A0092B-C50C-407E-A947-70E740481C1C}">
                 <a14:useLocalDpi xmlns:a14="http://schemas.microsoft.com/office/drawing/2010/main" val="0"/>
@@ -2789,7 +2789,7 @@
           <a:p>
             <a:fld id="{B03B4544-868C-4E0F-8B18-405C38F55D1E}" type="datetimeFigureOut">
               <a:rPr lang="en-GB" smtClean="0"/>
-              <a:t>26/11/17</a:t>
+              <a:t>28/11/2017</a:t>
             </a:fld>
             <a:endParaRPr lang="en-GB"/>
           </a:p>
@@ -2906,7 +2906,7 @@
           <p:nvPr/>
         </p:nvPicPr>
         <p:blipFill>
-          <a:blip r:embed="rId3">
+          <a:blip r:embed="rId3" cstate="print">
             <a:extLst>
               <a:ext uri="{28A0092B-C50C-407E-A947-70E740481C1C}">
                 <a14:useLocalDpi xmlns:a14="http://schemas.microsoft.com/office/drawing/2010/main" val="0"/>
@@ -3702,7 +3702,7 @@
           <a:p>
             <a:fld id="{B03B4544-868C-4E0F-8B18-405C38F55D1E}" type="datetimeFigureOut">
               <a:rPr lang="en-GB" smtClean="0"/>
-              <a:t>26/11/17</a:t>
+              <a:t>28/11/2017</a:t>
             </a:fld>
             <a:endParaRPr lang="en-GB"/>
           </a:p>
@@ -3819,7 +3819,7 @@
           <p:nvPr/>
         </p:nvPicPr>
         <p:blipFill>
-          <a:blip r:embed="rId3">
+          <a:blip r:embed="rId3" cstate="print">
             <a:extLst>
               <a:ext uri="{28A0092B-C50C-407E-A947-70E740481C1C}">
                 <a14:useLocalDpi xmlns:a14="http://schemas.microsoft.com/office/drawing/2010/main" val="0"/>
@@ -4015,7 +4015,7 @@
           <a:p>
             <a:fld id="{B03B4544-868C-4E0F-8B18-405C38F55D1E}" type="datetimeFigureOut">
               <a:rPr lang="en-GB" smtClean="0"/>
-              <a:t>26/11/17</a:t>
+              <a:t>28/11/2017</a:t>
             </a:fld>
             <a:endParaRPr lang="en-GB"/>
           </a:p>
@@ -4279,7 +4279,7 @@
           <a:p>
             <a:fld id="{B03B4544-868C-4E0F-8B18-405C38F55D1E}" type="datetimeFigureOut">
               <a:rPr lang="en-GB" smtClean="0"/>
-              <a:t>26/11/17</a:t>
+              <a:t>28/11/2017</a:t>
             </a:fld>
             <a:endParaRPr lang="en-GB"/>
           </a:p>
@@ -4410,7 +4410,7 @@
           <p:nvPr/>
         </p:nvPicPr>
         <p:blipFill>
-          <a:blip r:embed="rId3">
+          <a:blip r:embed="rId3" cstate="print">
             <a:extLst>
               <a:ext uri="{28A0092B-C50C-407E-A947-70E740481C1C}">
                 <a14:useLocalDpi xmlns:a14="http://schemas.microsoft.com/office/drawing/2010/main" val="0"/>
@@ -4602,7 +4602,7 @@
           <a:p>
             <a:fld id="{B03B4544-868C-4E0F-8B18-405C38F55D1E}" type="datetimeFigureOut">
               <a:rPr lang="en-GB" smtClean="0"/>
-              <a:t>26/11/17</a:t>
+              <a:t>28/11/2017</a:t>
             </a:fld>
             <a:endParaRPr lang="en-GB"/>
           </a:p>
@@ -4719,7 +4719,7 @@
           <p:nvPr/>
         </p:nvPicPr>
         <p:blipFill>
-          <a:blip r:embed="rId3">
+          <a:blip r:embed="rId3" cstate="print">
             <a:extLst>
               <a:ext uri="{28A0092B-C50C-407E-A947-70E740481C1C}">
                 <a14:useLocalDpi xmlns:a14="http://schemas.microsoft.com/office/drawing/2010/main" val="0"/>
@@ -4991,7 +4991,7 @@
           <a:p>
             <a:fld id="{B03B4544-868C-4E0F-8B18-405C38F55D1E}" type="datetimeFigureOut">
               <a:rPr lang="en-GB" smtClean="0"/>
-              <a:t>26/11/17</a:t>
+              <a:t>28/11/2017</a:t>
             </a:fld>
             <a:endParaRPr lang="en-GB"/>
           </a:p>
@@ -5113,7 +5113,7 @@
           <p:nvPr/>
         </p:nvPicPr>
         <p:blipFill>
-          <a:blip r:embed="rId3">
+          <a:blip r:embed="rId3" cstate="print">
             <a:extLst>
               <a:ext uri="{28A0092B-C50C-407E-A947-70E740481C1C}">
                 <a14:useLocalDpi xmlns:a14="http://schemas.microsoft.com/office/drawing/2010/main" val="0"/>
@@ -5367,7 +5367,7 @@
           <a:p>
             <a:fld id="{B03B4544-868C-4E0F-8B18-405C38F55D1E}" type="datetimeFigureOut">
               <a:rPr lang="en-GB" smtClean="0"/>
-              <a:t>26/11/17</a:t>
+              <a:t>28/11/2017</a:t>
             </a:fld>
             <a:endParaRPr lang="en-GB"/>
           </a:p>
@@ -5484,7 +5484,7 @@
           <p:nvPr/>
         </p:nvPicPr>
         <p:blipFill>
-          <a:blip r:embed="rId3">
+          <a:blip r:embed="rId3" cstate="print">
             <a:extLst>
               <a:ext uri="{28A0092B-C50C-407E-A947-70E740481C1C}">
                 <a14:useLocalDpi xmlns:a14="http://schemas.microsoft.com/office/drawing/2010/main" val="0"/>
@@ -5873,7 +5873,7 @@
           <a:p>
             <a:fld id="{B03B4544-868C-4E0F-8B18-405C38F55D1E}" type="datetimeFigureOut">
               <a:rPr lang="en-GB" smtClean="0"/>
-              <a:t>26/11/17</a:t>
+              <a:t>28/11/2017</a:t>
             </a:fld>
             <a:endParaRPr lang="en-GB"/>
           </a:p>
@@ -5990,7 +5990,7 @@
           <p:nvPr/>
         </p:nvPicPr>
         <p:blipFill>
-          <a:blip r:embed="rId3">
+          <a:blip r:embed="rId3" cstate="print">
             <a:extLst>
               <a:ext uri="{28A0092B-C50C-407E-A947-70E740481C1C}">
                 <a14:useLocalDpi xmlns:a14="http://schemas.microsoft.com/office/drawing/2010/main" val="0"/>
@@ -6130,7 +6130,7 @@
           <a:p>
             <a:fld id="{B03B4544-868C-4E0F-8B18-405C38F55D1E}" type="datetimeFigureOut">
               <a:rPr lang="en-GB" smtClean="0"/>
-              <a:t>26/11/17</a:t>
+              <a:t>28/11/2017</a:t>
             </a:fld>
             <a:endParaRPr lang="en-GB"/>
           </a:p>
@@ -6217,7 +6217,7 @@
           <p:nvPr/>
         </p:nvPicPr>
         <p:blipFill>
-          <a:blip r:embed="rId2">
+          <a:blip r:embed="rId2" cstate="print">
             <a:extLst>
               <a:ext uri="{28A0092B-C50C-407E-A947-70E740481C1C}">
                 <a14:useLocalDpi xmlns:a14="http://schemas.microsoft.com/office/drawing/2010/main" val="0"/>
@@ -6293,7 +6293,7 @@
           <a:p>
             <a:fld id="{B03B4544-868C-4E0F-8B18-405C38F55D1E}" type="datetimeFigureOut">
               <a:rPr lang="en-GB" smtClean="0"/>
-              <a:t>26/11/17</a:t>
+              <a:t>28/11/2017</a:t>
             </a:fld>
             <a:endParaRPr lang="en-GB"/>
           </a:p>
@@ -6410,7 +6410,7 @@
           <p:nvPr/>
         </p:nvPicPr>
         <p:blipFill>
-          <a:blip r:embed="rId3">
+          <a:blip r:embed="rId3" cstate="print">
             <a:extLst>
               <a:ext uri="{28A0092B-C50C-407E-A947-70E740481C1C}">
                 <a14:useLocalDpi xmlns:a14="http://schemas.microsoft.com/office/drawing/2010/main" val="0"/>
@@ -6683,7 +6683,7 @@
           <a:p>
             <a:fld id="{B03B4544-868C-4E0F-8B18-405C38F55D1E}" type="datetimeFigureOut">
               <a:rPr lang="en-GB" smtClean="0"/>
-              <a:t>26/11/17</a:t>
+              <a:t>28/11/2017</a:t>
             </a:fld>
             <a:endParaRPr lang="en-GB"/>
           </a:p>
@@ -6800,7 +6800,7 @@
           <p:nvPr/>
         </p:nvPicPr>
         <p:blipFill>
-          <a:blip r:embed="rId3">
+          <a:blip r:embed="rId3" cstate="print">
             <a:extLst>
               <a:ext uri="{28A0092B-C50C-407E-A947-70E740481C1C}">
                 <a14:useLocalDpi xmlns:a14="http://schemas.microsoft.com/office/drawing/2010/main" val="0"/>
@@ -7092,7 +7092,7 @@
           <a:p>
             <a:fld id="{B03B4544-868C-4E0F-8B18-405C38F55D1E}" type="datetimeFigureOut">
               <a:rPr lang="en-GB" smtClean="0"/>
-              <a:t>26/11/17</a:t>
+              <a:t>28/11/2017</a:t>
             </a:fld>
             <a:endParaRPr lang="en-GB"/>
           </a:p>
@@ -7336,7 +7336,7 @@
           <a:p>
             <a:fld id="{B03B4544-868C-4E0F-8B18-405C38F55D1E}" type="datetimeFigureOut">
               <a:rPr lang="en-GB" smtClean="0"/>
-              <a:t>26/11/17</a:t>
+              <a:t>28/11/2017</a:t>
             </a:fld>
             <a:endParaRPr lang="en-GB"/>
           </a:p>
@@ -7752,7 +7752,7 @@
           <p:cNvPr id="2" name="Title 1">
             <a:extLst>
               <a:ext uri="{FF2B5EF4-FFF2-40B4-BE49-F238E27FC236}">
-                <a16:creationId xmlns:a16="http://schemas.microsoft.com/office/drawing/2014/main" xmlns="" id="{8CF4034E-3FDD-4E4E-8076-FF0A6A6B857D}"/>
+                <a16:creationId xmlns="" xmlns:a16="http://schemas.microsoft.com/office/drawing/2014/main" id="{8CF4034E-3FDD-4E4E-8076-FF0A6A6B857D}"/>
               </a:ext>
             </a:extLst>
           </p:cNvPr>
@@ -7805,7 +7805,7 @@
           <p:cNvPr id="3" name="Subtitle 2">
             <a:extLst>
               <a:ext uri="{FF2B5EF4-FFF2-40B4-BE49-F238E27FC236}">
-                <a16:creationId xmlns:a16="http://schemas.microsoft.com/office/drawing/2014/main" xmlns="" id="{4A65D39A-DE8F-420D-8CDC-C22E02663E9E}"/>
+                <a16:creationId xmlns="" xmlns:a16="http://schemas.microsoft.com/office/drawing/2014/main" id="{4A65D39A-DE8F-420D-8CDC-C22E02663E9E}"/>
               </a:ext>
             </a:extLst>
           </p:cNvPr>
@@ -7863,8 +7863,25 @@
             </a:r>
             <a:r>
               <a:rPr lang="en-US" dirty="0"/>
-              <a:t>, Caterina Nahler, Tadej Vodopivec</a:t>
-            </a:r>
+              <a:t>, Caterina Nahler, </a:t>
+            </a:r>
+            <a:r>
+              <a:rPr lang="en-US" dirty="0" err="1"/>
+              <a:t>Tadej</a:t>
+            </a:r>
+            <a:r>
+              <a:rPr lang="en-US" dirty="0"/>
+              <a:t> </a:t>
+            </a:r>
+            <a:r>
+              <a:rPr lang="en-US" dirty="0" err="1" smtClean="0"/>
+              <a:t>Vodopivec</a:t>
+            </a:r>
+            <a:r>
+              <a:rPr lang="sl-SI" dirty="0" smtClean="0"/>
+              <a:t>, Klemen Turšič</a:t>
+            </a:r>
+            <a:endParaRPr lang="en-US" dirty="0"/>
           </a:p>
         </p:txBody>
       </p:sp>
@@ -7903,7 +7920,7 @@
           <p:cNvPr id="2" name="Title 1">
             <a:extLst>
               <a:ext uri="{FF2B5EF4-FFF2-40B4-BE49-F238E27FC236}">
-                <a16:creationId xmlns:a16="http://schemas.microsoft.com/office/drawing/2014/main" xmlns="" id="{68AB75D3-F735-4CAB-9045-52B444F584AD}"/>
+                <a16:creationId xmlns="" xmlns:a16="http://schemas.microsoft.com/office/drawing/2014/main" id="{68AB75D3-F735-4CAB-9045-52B444F584AD}"/>
               </a:ext>
             </a:extLst>
           </p:cNvPr>
@@ -7932,7 +7949,7 @@
           <p:cNvPr id="3" name="Content Placeholder 2">
             <a:extLst>
               <a:ext uri="{FF2B5EF4-FFF2-40B4-BE49-F238E27FC236}">
-                <a16:creationId xmlns:a16="http://schemas.microsoft.com/office/drawing/2014/main" xmlns="" id="{17026806-24B3-4EFF-8E37-BADD1979474B}"/>
+                <a16:creationId xmlns="" xmlns:a16="http://schemas.microsoft.com/office/drawing/2014/main" id="{17026806-24B3-4EFF-8E37-BADD1979474B}"/>
               </a:ext>
             </a:extLst>
           </p:cNvPr>
@@ -8083,7 +8100,7 @@
           <p:cNvPr id="2" name="Title 1">
             <a:extLst>
               <a:ext uri="{FF2B5EF4-FFF2-40B4-BE49-F238E27FC236}">
-                <a16:creationId xmlns:a16="http://schemas.microsoft.com/office/drawing/2014/main" xmlns="" id="{A4B8F059-21C2-4034-A3DF-97B0AD49340A}"/>
+                <a16:creationId xmlns="" xmlns:a16="http://schemas.microsoft.com/office/drawing/2014/main" id="{A4B8F059-21C2-4034-A3DF-97B0AD49340A}"/>
               </a:ext>
             </a:extLst>
           </p:cNvPr>
@@ -8112,7 +8129,7 @@
           <p:cNvPr id="3" name="Content Placeholder 2">
             <a:extLst>
               <a:ext uri="{FF2B5EF4-FFF2-40B4-BE49-F238E27FC236}">
-                <a16:creationId xmlns:a16="http://schemas.microsoft.com/office/drawing/2014/main" xmlns="" id="{E637A745-B171-41F2-BE0F-D8313EA97869}"/>
+                <a16:creationId xmlns="" xmlns:a16="http://schemas.microsoft.com/office/drawing/2014/main" id="{E637A745-B171-41F2-BE0F-D8313EA97869}"/>
               </a:ext>
             </a:extLst>
           </p:cNvPr>
@@ -8483,7 +8500,7 @@
           <p:cNvPr id="2" name="Title 1">
             <a:extLst>
               <a:ext uri="{FF2B5EF4-FFF2-40B4-BE49-F238E27FC236}">
-                <a16:creationId xmlns:a16="http://schemas.microsoft.com/office/drawing/2014/main" xmlns="" id="{1C6B8877-DF41-40C9-9346-EDB454E556F9}"/>
+                <a16:creationId xmlns="" xmlns:a16="http://schemas.microsoft.com/office/drawing/2014/main" id="{1C6B8877-DF41-40C9-9346-EDB454E556F9}"/>
               </a:ext>
             </a:extLst>
           </p:cNvPr>
@@ -8512,7 +8529,7 @@
           <p:cNvPr id="3" name="Content Placeholder 2">
             <a:extLst>
               <a:ext uri="{FF2B5EF4-FFF2-40B4-BE49-F238E27FC236}">
-                <a16:creationId xmlns:a16="http://schemas.microsoft.com/office/drawing/2014/main" xmlns="" id="{5595C900-23FE-4B0B-95B7-A9840256002A}"/>
+                <a16:creationId xmlns="" xmlns:a16="http://schemas.microsoft.com/office/drawing/2014/main" id="{5595C900-23FE-4B0B-95B7-A9840256002A}"/>
               </a:ext>
             </a:extLst>
           </p:cNvPr>
@@ -8810,7 +8827,7 @@
           <p:cNvPr id="2" name="Title 1">
             <a:extLst>
               <a:ext uri="{FF2B5EF4-FFF2-40B4-BE49-F238E27FC236}">
-                <a16:creationId xmlns:a16="http://schemas.microsoft.com/office/drawing/2014/main" xmlns="" id="{B0F457B2-8384-4975-ACD3-90FA43D62132}"/>
+                <a16:creationId xmlns="" xmlns:a16="http://schemas.microsoft.com/office/drawing/2014/main" id="{B0F457B2-8384-4975-ACD3-90FA43D62132}"/>
               </a:ext>
             </a:extLst>
           </p:cNvPr>
@@ -8839,7 +8856,7 @@
           <p:cNvPr id="3" name="Content Placeholder 2">
             <a:extLst>
               <a:ext uri="{FF2B5EF4-FFF2-40B4-BE49-F238E27FC236}">
-                <a16:creationId xmlns:a16="http://schemas.microsoft.com/office/drawing/2014/main" xmlns="" id="{60F0AB2F-F29C-40F8-BC64-97464C1C6ABD}"/>
+                <a16:creationId xmlns="" xmlns:a16="http://schemas.microsoft.com/office/drawing/2014/main" id="{60F0AB2F-F29C-40F8-BC64-97464C1C6ABD}"/>
               </a:ext>
             </a:extLst>
           </p:cNvPr>
@@ -9364,7 +9381,7 @@
   <a:extraClrSchemeLst/>
   <a:extLst>
     <a:ext uri="{05A4C25C-085E-4340-85A3-A5531E510DB2}">
-      <thm15:themeFamily xmlns:thm15="http://schemas.microsoft.com/office/thememl/2012/main" xmlns="" name="Berlin" id="{7B5DBA9E-B069-418E-9360-A61BDD0615A4}" vid="{C7DC10E3-4FF5-456B-A359-A0F378C1E5FB}"/>
+      <thm15:themeFamily xmlns="" xmlns:thm15="http://schemas.microsoft.com/office/thememl/2012/main" name="Berlin" id="{7B5DBA9E-B069-418E-9360-A61BDD0615A4}" vid="{C7DC10E3-4FF5-456B-A359-A0F378C1E5FB}"/>
     </a:ext>
   </a:extLst>
 </a:theme>

</xml_diff>